<commit_message>
modify check_ecei_image example script
</commit_message>
<xml_diff>
--- a/docs/how_to_make_ecei_image_using_fluctana.pptx
+++ b/docs/how_to_make_ecei_image_using_fluctana.pptx
@@ -8,7 +8,6 @@
     <p:sldId id="256" r:id="rId2"/>
     <p:sldId id="261" r:id="rId3"/>
     <p:sldId id="257" r:id="rId4"/>
-    <p:sldId id="259" r:id="rId5"/>
   </p:sldIdLst>
   <p:sldSz cx="12192000" cy="6858000"/>
   <p:notesSz cx="6858000" cy="9144000"/>
@@ -262,7 +261,7 @@
           <a:p>
             <a:fld id="{4438E3B3-06F7-4687-87CD-D4EAAFD57917}" type="datetimeFigureOut">
               <a:rPr lang="ko-KR" altLang="en-US" smtClean="0"/>
-              <a:t>2024. 12. 20.</a:t>
+              <a:t>2026-01-03</a:t>
             </a:fld>
             <a:endParaRPr lang="ko-KR" altLang="en-US"/>
           </a:p>
@@ -460,7 +459,7 @@
           <a:p>
             <a:fld id="{4438E3B3-06F7-4687-87CD-D4EAAFD57917}" type="datetimeFigureOut">
               <a:rPr lang="ko-KR" altLang="en-US" smtClean="0"/>
-              <a:t>2024. 12. 20.</a:t>
+              <a:t>2026-01-03</a:t>
             </a:fld>
             <a:endParaRPr lang="ko-KR" altLang="en-US"/>
           </a:p>
@@ -668,7 +667,7 @@
           <a:p>
             <a:fld id="{4438E3B3-06F7-4687-87CD-D4EAAFD57917}" type="datetimeFigureOut">
               <a:rPr lang="ko-KR" altLang="en-US" smtClean="0"/>
-              <a:t>2024. 12. 20.</a:t>
+              <a:t>2026-01-03</a:t>
             </a:fld>
             <a:endParaRPr lang="ko-KR" altLang="en-US"/>
           </a:p>
@@ -912,7 +911,7 @@
           <a:p>
             <a:fld id="{4438E3B3-06F7-4687-87CD-D4EAAFD57917}" type="datetimeFigureOut">
               <a:rPr lang="ko-KR" altLang="en-US" smtClean="0"/>
-              <a:t>2024. 12. 20.</a:t>
+              <a:t>2026-01-03</a:t>
             </a:fld>
             <a:endParaRPr lang="ko-KR" altLang="en-US"/>
           </a:p>
@@ -1187,7 +1186,7 @@
           <a:p>
             <a:fld id="{4438E3B3-06F7-4687-87CD-D4EAAFD57917}" type="datetimeFigureOut">
               <a:rPr lang="ko-KR" altLang="en-US" smtClean="0"/>
-              <a:t>2024. 12. 20.</a:t>
+              <a:t>2026-01-03</a:t>
             </a:fld>
             <a:endParaRPr lang="ko-KR" altLang="en-US"/>
           </a:p>
@@ -1452,7 +1451,7 @@
           <a:p>
             <a:fld id="{4438E3B3-06F7-4687-87CD-D4EAAFD57917}" type="datetimeFigureOut">
               <a:rPr lang="ko-KR" altLang="en-US" smtClean="0"/>
-              <a:t>2024. 12. 20.</a:t>
+              <a:t>2026-01-03</a:t>
             </a:fld>
             <a:endParaRPr lang="ko-KR" altLang="en-US"/>
           </a:p>
@@ -1864,7 +1863,7 @@
           <a:p>
             <a:fld id="{4438E3B3-06F7-4687-87CD-D4EAAFD57917}" type="datetimeFigureOut">
               <a:rPr lang="ko-KR" altLang="en-US" smtClean="0"/>
-              <a:t>2024. 12. 20.</a:t>
+              <a:t>2026-01-03</a:t>
             </a:fld>
             <a:endParaRPr lang="ko-KR" altLang="en-US"/>
           </a:p>
@@ -2005,7 +2004,7 @@
           <a:p>
             <a:fld id="{4438E3B3-06F7-4687-87CD-D4EAAFD57917}" type="datetimeFigureOut">
               <a:rPr lang="ko-KR" altLang="en-US" smtClean="0"/>
-              <a:t>2024. 12. 20.</a:t>
+              <a:t>2026-01-03</a:t>
             </a:fld>
             <a:endParaRPr lang="ko-KR" altLang="en-US"/>
           </a:p>
@@ -2118,7 +2117,7 @@
           <a:p>
             <a:fld id="{4438E3B3-06F7-4687-87CD-D4EAAFD57917}" type="datetimeFigureOut">
               <a:rPr lang="ko-KR" altLang="en-US" smtClean="0"/>
-              <a:t>2024. 12. 20.</a:t>
+              <a:t>2026-01-03</a:t>
             </a:fld>
             <a:endParaRPr lang="ko-KR" altLang="en-US"/>
           </a:p>
@@ -2429,7 +2428,7 @@
           <a:p>
             <a:fld id="{4438E3B3-06F7-4687-87CD-D4EAAFD57917}" type="datetimeFigureOut">
               <a:rPr lang="ko-KR" altLang="en-US" smtClean="0"/>
-              <a:t>2024. 12. 20.</a:t>
+              <a:t>2026-01-03</a:t>
             </a:fld>
             <a:endParaRPr lang="ko-KR" altLang="en-US"/>
           </a:p>
@@ -2720,7 +2719,7 @@
           <a:p>
             <a:fld id="{4438E3B3-06F7-4687-87CD-D4EAAFD57917}" type="datetimeFigureOut">
               <a:rPr lang="ko-KR" altLang="en-US" smtClean="0"/>
-              <a:t>2024. 12. 20.</a:t>
+              <a:t>2026-01-03</a:t>
             </a:fld>
             <a:endParaRPr lang="ko-KR" altLang="en-US"/>
           </a:p>
@@ -2961,7 +2960,7 @@
           <a:p>
             <a:fld id="{4438E3B3-06F7-4687-87CD-D4EAAFD57917}" type="datetimeFigureOut">
               <a:rPr lang="ko-KR" altLang="en-US" smtClean="0"/>
-              <a:t>2024. 12. 20.</a:t>
+              <a:t>2026-01-03</a:t>
             </a:fld>
             <a:endParaRPr lang="ko-KR" altLang="en-US"/>
           </a:p>
@@ -4261,139 +4260,12 @@
           </a:p>
         </p:txBody>
       </p:sp>
-      <p:sp>
-        <p:nvSpPr>
-          <p:cNvPr id="3" name="내용 개체 틀 2">
-            <a:extLst>
-              <a:ext uri="{FF2B5EF4-FFF2-40B4-BE49-F238E27FC236}">
-                <a16:creationId xmlns:a16="http://schemas.microsoft.com/office/drawing/2014/main" id="{4343040B-7D14-44B0-A43C-F0C039D8AA63}"/>
-              </a:ext>
-            </a:extLst>
-          </p:cNvPr>
-          <p:cNvSpPr>
-            <a:spLocks noGrp="1"/>
-          </p:cNvSpPr>
-          <p:nvPr>
-            <p:ph idx="1"/>
-          </p:nvPr>
-        </p:nvSpPr>
-        <p:spPr>
-          <a:xfrm>
-            <a:off x="312420" y="952500"/>
-            <a:ext cx="11567160" cy="5767477"/>
-          </a:xfrm>
-        </p:spPr>
-        <p:txBody>
-          <a:bodyPr>
-            <a:normAutofit/>
-          </a:bodyPr>
-          <a:lstStyle/>
-          <a:p>
-            <a:r>
-              <a:rPr lang="en-US" altLang="ko-KR" dirty="0"/>
-              <a:t>I suggest to work on </a:t>
-            </a:r>
-            <a:r>
-              <a:rPr lang="en-US" altLang="ko-KR" dirty="0" err="1"/>
-              <a:t>ipython</a:t>
-            </a:r>
-            <a:endParaRPr lang="en-US" altLang="ko-KR" dirty="0"/>
-          </a:p>
-          <a:p>
-            <a:pPr lvl="1"/>
-            <a:r>
-              <a:rPr lang="en-US" altLang="ko-KR" dirty="0"/>
-              <a:t>It is faster to plot the image</a:t>
-            </a:r>
-          </a:p>
-          <a:p>
-            <a:pPr lvl="1"/>
-            <a:r>
-              <a:rPr lang="en-US" altLang="ko-KR" dirty="0"/>
-              <a:t>Command history is preserved</a:t>
-            </a:r>
-          </a:p>
-          <a:p>
-            <a:pPr lvl="1"/>
-            <a:endParaRPr lang="en-US" altLang="ko-KR" dirty="0"/>
-          </a:p>
-          <a:p>
-            <a:r>
-              <a:rPr lang="en-US" altLang="ko-KR" dirty="0"/>
-              <a:t>Import </a:t>
-            </a:r>
-            <a:r>
-              <a:rPr lang="en-US" altLang="ko-KR" dirty="0" err="1"/>
-              <a:t>check_ecei_image</a:t>
-            </a:r>
-            <a:endParaRPr lang="en-US" altLang="ko-KR" dirty="0"/>
-          </a:p>
-          <a:p>
-            <a:endParaRPr lang="en-US" altLang="ko-KR" dirty="0"/>
-          </a:p>
-          <a:p>
-            <a:r>
-              <a:rPr lang="en-US" altLang="ko-KR" dirty="0"/>
-              <a:t>Play the image</a:t>
-            </a:r>
-          </a:p>
-          <a:p>
-            <a:endParaRPr lang="en-US" altLang="ko-KR" dirty="0"/>
-          </a:p>
-          <a:p>
-            <a:r>
-              <a:rPr lang="en-US" altLang="ko-KR" dirty="0"/>
-              <a:t>You can choose ‘automatic’ or ‘manual’ mode </a:t>
-            </a:r>
-            <a:r>
-              <a:rPr lang="en-US" altLang="ko-KR"/>
-              <a:t>by entering </a:t>
-            </a:r>
-            <a:r>
-              <a:rPr lang="en-US" altLang="ko-KR" dirty="0"/>
-              <a:t>0 or 1</a:t>
-            </a:r>
-          </a:p>
-          <a:p>
-            <a:pPr lvl="1"/>
-            <a:r>
-              <a:rPr lang="en-US" altLang="ko-KR" dirty="0"/>
-              <a:t>‘automatic’ mode : You can select time step [frame index unit]</a:t>
-            </a:r>
-          </a:p>
-          <a:p>
-            <a:pPr lvl="1"/>
-            <a:endParaRPr lang="en-US" altLang="ko-KR" dirty="0"/>
-          </a:p>
-          <a:p>
-            <a:pPr lvl="1"/>
-            <a:endParaRPr lang="en-US" altLang="ko-KR" sz="1400" dirty="0"/>
-          </a:p>
-          <a:p>
-            <a:pPr lvl="1"/>
-            <a:r>
-              <a:rPr lang="en-US" altLang="ko-KR" dirty="0"/>
-              <a:t>‘manual’ mode : You can select the time point to plot the image in the top</a:t>
-            </a:r>
-            <a:br>
-              <a:rPr lang="en-US" altLang="ko-KR" dirty="0"/>
-            </a:br>
-            <a:r>
-              <a:rPr lang="en-US" altLang="ko-KR" dirty="0"/>
-              <a:t>axes until you click the point beyond the available range</a:t>
-            </a:r>
-          </a:p>
-          <a:p>
-            <a:endParaRPr lang="en-US" altLang="ko-KR" dirty="0"/>
-          </a:p>
-        </p:txBody>
-      </p:sp>
       <p:pic>
         <p:nvPicPr>
-          <p:cNvPr id="5" name="그림 4">
-            <a:extLst>
-              <a:ext uri="{FF2B5EF4-FFF2-40B4-BE49-F238E27FC236}">
-                <a16:creationId xmlns:a16="http://schemas.microsoft.com/office/drawing/2014/main" id="{CE5D48F3-0C83-4691-A3D2-56DC3CCC6039}"/>
+          <p:cNvPr id="9" name="그림 8">
+            <a:extLst>
+              <a:ext uri="{FF2B5EF4-FFF2-40B4-BE49-F238E27FC236}">
+                <a16:creationId xmlns:a16="http://schemas.microsoft.com/office/drawing/2014/main" id="{AD90232C-6B62-4948-882D-AA27CF87FAA2}"/>
               </a:ext>
             </a:extLst>
           </p:cNvPr>
@@ -4402,28 +4274,56 @@
           </p:cNvPicPr>
           <p:nvPr/>
         </p:nvPicPr>
-        <p:blipFill>
+        <p:blipFill rotWithShape="1">
           <a:blip r:embed="rId2"/>
-          <a:stretch>
-            <a:fillRect/>
-          </a:stretch>
+          <a:srcRect l="1008"/>
+          <a:stretch/>
         </p:blipFill>
         <p:spPr>
           <a:xfrm>
-            <a:off x="765864" y="2133061"/>
-            <a:ext cx="3276600" cy="190500"/>
+            <a:off x="9230264" y="1685640"/>
+            <a:ext cx="2649316" cy="5152516"/>
           </a:xfrm>
           <a:prstGeom prst="rect">
             <a:avLst/>
           </a:prstGeom>
         </p:spPr>
       </p:pic>
+      <p:sp>
+        <p:nvSpPr>
+          <p:cNvPr id="10" name="내용 개체 틀 9">
+            <a:extLst>
+              <a:ext uri="{FF2B5EF4-FFF2-40B4-BE49-F238E27FC236}">
+                <a16:creationId xmlns:a16="http://schemas.microsoft.com/office/drawing/2014/main" id="{9869B096-3D3C-401D-ACBE-9BF425919376}"/>
+              </a:ext>
+            </a:extLst>
+          </p:cNvPr>
+          <p:cNvSpPr>
+            <a:spLocks noGrp="1"/>
+          </p:cNvSpPr>
+          <p:nvPr>
+            <p:ph idx="1"/>
+          </p:nvPr>
+        </p:nvSpPr>
+        <p:spPr/>
+        <p:txBody>
+          <a:bodyPr/>
+          <a:lstStyle/>
+          <a:p>
+            <a:r>
+              <a:rPr lang="en-US" altLang="ko-KR" dirty="0"/>
+              <a:t>Run the script with the following arguments</a:t>
+            </a:r>
+            <a:endParaRPr lang="ko-KR" altLang="en-US" dirty="0"/>
+          </a:p>
+        </p:txBody>
+      </p:sp>
       <p:pic>
         <p:nvPicPr>
-          <p:cNvPr id="6" name="그림 5">
-            <a:extLst>
-              <a:ext uri="{FF2B5EF4-FFF2-40B4-BE49-F238E27FC236}">
-                <a16:creationId xmlns:a16="http://schemas.microsoft.com/office/drawing/2014/main" id="{209210DD-3C5F-4B41-A19C-AB26A3CD2FAB}"/>
+          <p:cNvPr id="22" name="그림 21">
+            <a:extLst>
+              <a:ext uri="{FF2B5EF4-FFF2-40B4-BE49-F238E27FC236}">
+                <a16:creationId xmlns:a16="http://schemas.microsoft.com/office/drawing/2014/main" id="{49D0EDDC-C931-47C3-9EB9-ADDA4666EF14}"/>
               </a:ext>
             </a:extLst>
           </p:cNvPr>
@@ -4440,190 +4340,30 @@
         </p:blipFill>
         <p:spPr>
           <a:xfrm>
-            <a:off x="765864" y="2958412"/>
-            <a:ext cx="2952750" cy="190500"/>
+            <a:off x="412757" y="1431510"/>
+            <a:ext cx="8410636" cy="2219341"/>
           </a:xfrm>
           <a:prstGeom prst="rect">
             <a:avLst/>
           </a:prstGeom>
         </p:spPr>
       </p:pic>
-      <p:pic>
-        <p:nvPicPr>
-          <p:cNvPr id="7" name="그림 6">
-            <a:extLst>
-              <a:ext uri="{FF2B5EF4-FFF2-40B4-BE49-F238E27FC236}">
-                <a16:creationId xmlns:a16="http://schemas.microsoft.com/office/drawing/2014/main" id="{2F530F1F-5AFF-442A-9BA0-C15C623FDBCF}"/>
-              </a:ext>
-            </a:extLst>
-          </p:cNvPr>
-          <p:cNvPicPr>
-            <a:picLocks noChangeAspect="1"/>
-          </p:cNvPicPr>
+      <p:sp>
+        <p:nvSpPr>
+          <p:cNvPr id="23" name="TextBox 22">
+            <a:extLst>
+              <a:ext uri="{FF2B5EF4-FFF2-40B4-BE49-F238E27FC236}">
+                <a16:creationId xmlns:a16="http://schemas.microsoft.com/office/drawing/2014/main" id="{B775C900-0C5C-4CEF-A0AB-9703E817F509}"/>
+              </a:ext>
+            </a:extLst>
+          </p:cNvPr>
+          <p:cNvSpPr txBox="1"/>
           <p:nvPr/>
-        </p:nvPicPr>
-        <p:blipFill>
-          <a:blip r:embed="rId4"/>
-          <a:stretch>
-            <a:fillRect/>
-          </a:stretch>
-        </p:blipFill>
+        </p:nvSpPr>
         <p:spPr>
           <a:xfrm>
-            <a:off x="765864" y="3836238"/>
-            <a:ext cx="7286625" cy="257175"/>
-          </a:xfrm>
-          <a:prstGeom prst="rect">
-            <a:avLst/>
-          </a:prstGeom>
-        </p:spPr>
-      </p:pic>
-      <p:pic>
-        <p:nvPicPr>
-          <p:cNvPr id="8" name="그림 7">
-            <a:extLst>
-              <a:ext uri="{FF2B5EF4-FFF2-40B4-BE49-F238E27FC236}">
-                <a16:creationId xmlns:a16="http://schemas.microsoft.com/office/drawing/2014/main" id="{349559A7-5959-4CBD-89F5-F54A65AF465D}"/>
-              </a:ext>
-            </a:extLst>
-          </p:cNvPr>
-          <p:cNvPicPr>
-            <a:picLocks noChangeAspect="1"/>
-          </p:cNvPicPr>
-          <p:nvPr/>
-        </p:nvPicPr>
-        <p:blipFill>
-          <a:blip r:embed="rId5"/>
-          <a:stretch>
-            <a:fillRect/>
-          </a:stretch>
-        </p:blipFill>
-        <p:spPr>
-          <a:xfrm>
-            <a:off x="767256" y="5124629"/>
-            <a:ext cx="2419350" cy="361950"/>
-          </a:xfrm>
-          <a:prstGeom prst="rect">
-            <a:avLst/>
-          </a:prstGeom>
-        </p:spPr>
-      </p:pic>
-      <p:pic>
-        <p:nvPicPr>
-          <p:cNvPr id="9" name="그림 8">
-            <a:extLst>
-              <a:ext uri="{FF2B5EF4-FFF2-40B4-BE49-F238E27FC236}">
-                <a16:creationId xmlns:a16="http://schemas.microsoft.com/office/drawing/2014/main" id="{AD90232C-6B62-4948-882D-AA27CF87FAA2}"/>
-              </a:ext>
-            </a:extLst>
-          </p:cNvPr>
-          <p:cNvPicPr>
-            <a:picLocks noChangeAspect="1"/>
-          </p:cNvPicPr>
-          <p:nvPr/>
-        </p:nvPicPr>
-        <p:blipFill rotWithShape="1">
-          <a:blip r:embed="rId6"/>
-          <a:srcRect l="1008"/>
-          <a:stretch/>
-        </p:blipFill>
-        <p:spPr>
-          <a:xfrm>
-            <a:off x="9230264" y="1685640"/>
-            <a:ext cx="2649316" cy="5152516"/>
-          </a:xfrm>
-          <a:prstGeom prst="rect">
-            <a:avLst/>
-          </a:prstGeom>
-        </p:spPr>
-      </p:pic>
-      <p:cxnSp>
-        <p:nvCxnSpPr>
-          <p:cNvPr id="11" name="직선 화살표 연결선 10">
-            <a:extLst>
-              <a:ext uri="{FF2B5EF4-FFF2-40B4-BE49-F238E27FC236}">
-                <a16:creationId xmlns:a16="http://schemas.microsoft.com/office/drawing/2014/main" id="{FE2D1E3F-3C5F-43EF-BF1F-D47E1EDF3A8C}"/>
-              </a:ext>
-            </a:extLst>
-          </p:cNvPr>
-          <p:cNvCxnSpPr>
-            <a:cxnSpLocks/>
-          </p:cNvCxnSpPr>
-          <p:nvPr/>
-        </p:nvCxnSpPr>
-        <p:spPr>
-          <a:xfrm flipV="1">
-            <a:off x="8473388" y="2743201"/>
-            <a:ext cx="1360725" cy="2898474"/>
-          </a:xfrm>
-          <a:prstGeom prst="straightConnector1">
-            <a:avLst/>
-          </a:prstGeom>
-          <a:ln>
-            <a:tailEnd type="triangle"/>
-          </a:ln>
-        </p:spPr>
-        <p:style>
-          <a:lnRef idx="1">
-            <a:schemeClr val="accent1"/>
-          </a:lnRef>
-          <a:fillRef idx="0">
-            <a:schemeClr val="accent1"/>
-          </a:fillRef>
-          <a:effectRef idx="0">
-            <a:schemeClr val="accent1"/>
-          </a:effectRef>
-          <a:fontRef idx="minor">
-            <a:schemeClr val="tx1"/>
-          </a:fontRef>
-        </p:style>
-      </p:cxnSp>
-      <p:pic>
-        <p:nvPicPr>
-          <p:cNvPr id="13" name="그림 12">
-            <a:extLst>
-              <a:ext uri="{FF2B5EF4-FFF2-40B4-BE49-F238E27FC236}">
-                <a16:creationId xmlns:a16="http://schemas.microsoft.com/office/drawing/2014/main" id="{12FF0790-7F66-4455-824B-834A6121A284}"/>
-              </a:ext>
-            </a:extLst>
-          </p:cNvPr>
-          <p:cNvPicPr>
-            <a:picLocks noChangeAspect="1"/>
-          </p:cNvPicPr>
-          <p:nvPr/>
-        </p:nvPicPr>
-        <p:blipFill>
-          <a:blip r:embed="rId7"/>
-          <a:stretch>
-            <a:fillRect/>
-          </a:stretch>
-        </p:blipFill>
-        <p:spPr>
-          <a:xfrm>
-            <a:off x="759888" y="6267860"/>
-            <a:ext cx="3857625" cy="476250"/>
-          </a:xfrm>
-          <a:prstGeom prst="rect">
-            <a:avLst/>
-          </a:prstGeom>
-        </p:spPr>
-      </p:pic>
-      <p:sp>
-        <p:nvSpPr>
-          <p:cNvPr id="16" name="TextBox 15">
-            <a:extLst>
-              <a:ext uri="{FF2B5EF4-FFF2-40B4-BE49-F238E27FC236}">
-                <a16:creationId xmlns:a16="http://schemas.microsoft.com/office/drawing/2014/main" id="{C0160AB8-FA15-4523-962D-317D0EDC5E38}"/>
-              </a:ext>
-            </a:extLst>
-          </p:cNvPr>
-          <p:cNvSpPr txBox="1"/>
-          <p:nvPr/>
-        </p:nvSpPr>
-        <p:spPr>
-          <a:xfrm>
-            <a:off x="2975082" y="3524423"/>
-            <a:ext cx="1197507" cy="369332"/>
+            <a:off x="308307" y="5029694"/>
+            <a:ext cx="8694560" cy="646331"/>
           </a:xfrm>
           <a:prstGeom prst="rect">
             <a:avLst/>
@@ -4638,7 +4378,61 @@
           <a:p>
             <a:r>
               <a:rPr lang="en-US" altLang="ko-KR" dirty="0"/>
-              <a:t>time range</a:t>
+              <a:t>You can try to change interpolation methods or plot type</a:t>
+            </a:r>
+          </a:p>
+          <a:p>
+            <a:r>
+              <a:rPr lang="en-US" altLang="ko-KR" dirty="0"/>
+              <a:t>by changing ‘</a:t>
+            </a:r>
+            <a:r>
+              <a:rPr lang="en-US" altLang="ko-KR" dirty="0" err="1"/>
+              <a:t>istep</a:t>
+            </a:r>
+            <a:r>
+              <a:rPr lang="en-US" altLang="ko-KR" dirty="0"/>
+              <a:t>’, ‘</a:t>
+            </a:r>
+            <a:r>
+              <a:rPr lang="en-US" altLang="ko-KR" dirty="0" err="1"/>
+              <a:t>imethod</a:t>
+            </a:r>
+            <a:r>
+              <a:rPr lang="en-US" altLang="ko-KR" dirty="0"/>
+              <a:t>’ [‘</a:t>
+            </a:r>
+            <a:r>
+              <a:rPr lang="en-US" altLang="ko-KR" dirty="0" err="1"/>
+              <a:t>linear’,’nearest’,’cubic</a:t>
+            </a:r>
+            <a:r>
+              <a:rPr lang="en-US" altLang="ko-KR" dirty="0"/>
+              <a:t>’], ‘</a:t>
+            </a:r>
+            <a:r>
+              <a:rPr lang="en-US" altLang="ko-KR" dirty="0" err="1"/>
+              <a:t>bcut</a:t>
+            </a:r>
+            <a:r>
+              <a:rPr lang="en-US" altLang="ko-KR" dirty="0"/>
+              <a:t>’, ‘</a:t>
+            </a:r>
+            <a:r>
+              <a:rPr lang="en-US" altLang="ko-KR" dirty="0" err="1"/>
+              <a:t>pmethod</a:t>
+            </a:r>
+            <a:r>
+              <a:rPr lang="en-US" altLang="ko-KR" dirty="0"/>
+              <a:t>’ [‘</a:t>
+            </a:r>
+            <a:r>
+              <a:rPr lang="en-US" altLang="ko-KR" dirty="0" err="1"/>
+              <a:t>image’,’contour</a:t>
+            </a:r>
+            <a:r>
+              <a:rPr lang="en-US" altLang="ko-KR" dirty="0"/>
+              <a:t>’]</a:t>
             </a:r>
             <a:endParaRPr lang="ko-KR" altLang="en-US" dirty="0"/>
           </a:p>
@@ -4646,10 +4440,10 @@
       </p:sp>
       <p:sp>
         <p:nvSpPr>
-          <p:cNvPr id="17" name="TextBox 16">
-            <a:extLst>
-              <a:ext uri="{FF2B5EF4-FFF2-40B4-BE49-F238E27FC236}">
-                <a16:creationId xmlns:a16="http://schemas.microsoft.com/office/drawing/2014/main" id="{9C4826BC-A3D1-4254-A411-C5E6A9049C42}"/>
+          <p:cNvPr id="24" name="TextBox 23">
+            <a:extLst>
+              <a:ext uri="{FF2B5EF4-FFF2-40B4-BE49-F238E27FC236}">
+                <a16:creationId xmlns:a16="http://schemas.microsoft.com/office/drawing/2014/main" id="{35999E77-2198-419C-9CEF-5078AB803B40}"/>
               </a:ext>
             </a:extLst>
           </p:cNvPr>
@@ -4658,8 +4452,8 @@
         </p:nvSpPr>
         <p:spPr>
           <a:xfrm>
-            <a:off x="4429037" y="3212005"/>
-            <a:ext cx="716863" cy="646331"/>
+            <a:off x="308307" y="4217554"/>
+            <a:ext cx="5611601" cy="646331"/>
           </a:xfrm>
           <a:prstGeom prst="rect">
             <a:avLst/>
@@ -4672,107 +4466,24 @@
           </a:bodyPr>
           <a:lstStyle/>
           <a:p>
-            <a:br>
+            <a:r>
               <a:rPr lang="en-US" altLang="ko-KR" dirty="0"/>
-            </a:br>
+              <a:t>You can also apply the </a:t>
+            </a:r>
+            <a:r>
+              <a:rPr lang="en-US" altLang="ko-KR" dirty="0" err="1"/>
+              <a:t>svd</a:t>
+            </a:r>
             <a:r>
               <a:rPr lang="en-US" altLang="ko-KR" dirty="0"/>
-              <a:t>name</a:t>
-            </a:r>
-            <a:endParaRPr lang="ko-KR" altLang="en-US" dirty="0"/>
-          </a:p>
-        </p:txBody>
-      </p:sp>
-      <p:sp>
-        <p:nvSpPr>
-          <p:cNvPr id="18" name="TextBox 17">
-            <a:extLst>
-              <a:ext uri="{FF2B5EF4-FFF2-40B4-BE49-F238E27FC236}">
-                <a16:creationId xmlns:a16="http://schemas.microsoft.com/office/drawing/2014/main" id="{41B80E54-593B-4320-AEE6-E681E5058FB1}"/>
-              </a:ext>
-            </a:extLst>
-          </p:cNvPr>
-          <p:cNvSpPr txBox="1"/>
-          <p:nvPr/>
-        </p:nvSpPr>
-        <p:spPr>
-          <a:xfrm>
-            <a:off x="5196367" y="2958412"/>
-            <a:ext cx="1248803" cy="923330"/>
-          </a:xfrm>
-          <a:prstGeom prst="rect">
-            <a:avLst/>
-          </a:prstGeom>
-          <a:noFill/>
-        </p:spPr>
-        <p:txBody>
-          <a:bodyPr wrap="none" rtlCol="0">
-            <a:spAutoFit/>
-          </a:bodyPr>
-          <a:lstStyle/>
+              <a:t> filter after the FFT or FIR filters</a:t>
+            </a:r>
+          </a:p>
           <a:p>
             <a:r>
               <a:rPr lang="en-US" altLang="ko-KR" dirty="0"/>
-              <a:t>FIR</a:t>
-            </a:r>
-            <a:br>
-              <a:rPr lang="en-US" altLang="ko-KR" dirty="0"/>
-            </a:br>
-            <a:r>
-              <a:rPr lang="en-US" altLang="ko-KR" dirty="0"/>
-              <a:t>band-pass</a:t>
-            </a:r>
-            <a:br>
-              <a:rPr lang="en-US" altLang="ko-KR" dirty="0"/>
-            </a:br>
-            <a:r>
-              <a:rPr lang="en-US" altLang="ko-KR" dirty="0"/>
-              <a:t>range [kHz]</a:t>
-            </a:r>
-            <a:endParaRPr lang="ko-KR" altLang="en-US" dirty="0"/>
-          </a:p>
-        </p:txBody>
-      </p:sp>
-      <p:sp>
-        <p:nvSpPr>
-          <p:cNvPr id="19" name="TextBox 18">
-            <a:extLst>
-              <a:ext uri="{FF2B5EF4-FFF2-40B4-BE49-F238E27FC236}">
-                <a16:creationId xmlns:a16="http://schemas.microsoft.com/office/drawing/2014/main" id="{F61163D4-C4D3-4551-A5EF-86ED3CDCEC0C}"/>
-              </a:ext>
-            </a:extLst>
-          </p:cNvPr>
-          <p:cNvSpPr txBox="1"/>
-          <p:nvPr/>
-        </p:nvSpPr>
-        <p:spPr>
-          <a:xfrm>
-            <a:off x="6617335" y="3221096"/>
-            <a:ext cx="684803" cy="646331"/>
-          </a:xfrm>
-          <a:prstGeom prst="rect">
-            <a:avLst/>
-          </a:prstGeom>
-          <a:noFill/>
-        </p:spPr>
-        <p:txBody>
-          <a:bodyPr wrap="none" rtlCol="0">
-            <a:spAutoFit/>
-          </a:bodyPr>
-          <a:lstStyle/>
-          <a:p>
-            <a:r>
-              <a:rPr lang="en-US" altLang="ko-KR" dirty="0"/>
-              <a:t>Color</a:t>
-            </a:r>
-            <a:br>
-              <a:rPr lang="en-US" altLang="ko-KR" dirty="0"/>
-            </a:br>
-            <a:r>
-              <a:rPr lang="en-US" altLang="ko-KR" dirty="0"/>
-              <a:t>scale</a:t>
-            </a:r>
-            <a:endParaRPr lang="ko-KR" altLang="en-US" dirty="0"/>
+              <a:t>Please refer to ‘check_filter.py’ in ‘examples’</a:t>
+            </a:r>
           </a:p>
         </p:txBody>
       </p:sp>
@@ -4780,339 +4491,6 @@
     <p:extLst>
       <p:ext uri="{BB962C8B-B14F-4D97-AF65-F5344CB8AC3E}">
         <p14:creationId xmlns:p14="http://schemas.microsoft.com/office/powerpoint/2010/main" val="2106789393"/>
-      </p:ext>
-    </p:extLst>
-  </p:cSld>
-  <p:clrMapOvr>
-    <a:masterClrMapping/>
-  </p:clrMapOvr>
-</p:sld>
-</file>
-
-<file path=ppt/slides/slide4.xml><?xml version="1.0" encoding="utf-8"?>
-<p:sld xmlns:a="http://schemas.openxmlformats.org/drawingml/2006/main" xmlns:r="http://schemas.openxmlformats.org/officeDocument/2006/relationships" xmlns:p="http://schemas.openxmlformats.org/presentationml/2006/main">
-  <p:cSld>
-    <p:spTree>
-      <p:nvGrpSpPr>
-        <p:cNvPr id="1" name=""/>
-        <p:cNvGrpSpPr/>
-        <p:nvPr/>
-      </p:nvGrpSpPr>
-      <p:grpSpPr>
-        <a:xfrm>
-          <a:off x="0" y="0"/>
-          <a:ext cx="0" cy="0"/>
-          <a:chOff x="0" y="0"/>
-          <a:chExt cx="0" cy="0"/>
-        </a:xfrm>
-      </p:grpSpPr>
-      <p:pic>
-        <p:nvPicPr>
-          <p:cNvPr id="5" name="그림 4">
-            <a:extLst>
-              <a:ext uri="{FF2B5EF4-FFF2-40B4-BE49-F238E27FC236}">
-                <a16:creationId xmlns:a16="http://schemas.microsoft.com/office/drawing/2014/main" id="{927C8BF2-A030-4827-8F60-0D13D3E5845A}"/>
-              </a:ext>
-            </a:extLst>
-          </p:cNvPr>
-          <p:cNvPicPr>
-            <a:picLocks noChangeAspect="1"/>
-          </p:cNvPicPr>
-          <p:nvPr/>
-        </p:nvPicPr>
-        <p:blipFill>
-          <a:blip r:embed="rId2"/>
-          <a:stretch>
-            <a:fillRect/>
-          </a:stretch>
-        </p:blipFill>
-        <p:spPr>
-          <a:xfrm>
-            <a:off x="1107340" y="1672958"/>
-            <a:ext cx="6097995" cy="2655348"/>
-          </a:xfrm>
-          <a:prstGeom prst="rect">
-            <a:avLst/>
-          </a:prstGeom>
-        </p:spPr>
-      </p:pic>
-      <p:sp>
-        <p:nvSpPr>
-          <p:cNvPr id="2" name="제목 1">
-            <a:extLst>
-              <a:ext uri="{FF2B5EF4-FFF2-40B4-BE49-F238E27FC236}">
-                <a16:creationId xmlns:a16="http://schemas.microsoft.com/office/drawing/2014/main" id="{6F209633-9404-448A-97C5-5E766226C0D0}"/>
-              </a:ext>
-            </a:extLst>
-          </p:cNvPr>
-          <p:cNvSpPr>
-            <a:spLocks noGrp="1"/>
-          </p:cNvSpPr>
-          <p:nvPr>
-            <p:ph type="title"/>
-          </p:nvPr>
-        </p:nvSpPr>
-        <p:spPr/>
-        <p:txBody>
-          <a:bodyPr/>
-          <a:lstStyle/>
-          <a:p>
-            <a:r>
-              <a:rPr lang="en-US" altLang="ko-KR" dirty="0"/>
-              <a:t>Note on check_ecei_image.py</a:t>
-            </a:r>
-            <a:endParaRPr lang="ko-KR" altLang="en-US" dirty="0"/>
-          </a:p>
-        </p:txBody>
-      </p:sp>
-      <p:sp>
-        <p:nvSpPr>
-          <p:cNvPr id="17" name="내용 개체 틀 16">
-            <a:extLst>
-              <a:ext uri="{FF2B5EF4-FFF2-40B4-BE49-F238E27FC236}">
-                <a16:creationId xmlns:a16="http://schemas.microsoft.com/office/drawing/2014/main" id="{9742E21B-1715-4617-B797-06B49D26C2F5}"/>
-              </a:ext>
-            </a:extLst>
-          </p:cNvPr>
-          <p:cNvSpPr>
-            <a:spLocks noGrp="1"/>
-          </p:cNvSpPr>
-          <p:nvPr>
-            <p:ph idx="1"/>
-          </p:nvPr>
-        </p:nvSpPr>
-        <p:spPr/>
-        <p:txBody>
-          <a:bodyPr/>
-          <a:lstStyle/>
-          <a:p>
-            <a:r>
-              <a:rPr lang="en-US" altLang="ko-KR" dirty="0"/>
-              <a:t>More options for a better image</a:t>
-            </a:r>
-            <a:endParaRPr lang="ko-KR" altLang="en-US" dirty="0"/>
-          </a:p>
-        </p:txBody>
-      </p:sp>
-      <p:sp>
-        <p:nvSpPr>
-          <p:cNvPr id="7" name="TextBox 6">
-            <a:extLst>
-              <a:ext uri="{FF2B5EF4-FFF2-40B4-BE49-F238E27FC236}">
-                <a16:creationId xmlns:a16="http://schemas.microsoft.com/office/drawing/2014/main" id="{E60EAD9E-571F-4BFD-B1D0-EF366B11869F}"/>
-              </a:ext>
-            </a:extLst>
-          </p:cNvPr>
-          <p:cNvSpPr txBox="1"/>
-          <p:nvPr/>
-        </p:nvSpPr>
-        <p:spPr>
-          <a:xfrm>
-            <a:off x="1754988" y="4556546"/>
-            <a:ext cx="8969700" cy="646331"/>
-          </a:xfrm>
-          <a:prstGeom prst="rect">
-            <a:avLst/>
-          </a:prstGeom>
-          <a:noFill/>
-        </p:spPr>
-        <p:txBody>
-          <a:bodyPr wrap="none" rtlCol="0">
-            <a:spAutoFit/>
-          </a:bodyPr>
-          <a:lstStyle/>
-          <a:p>
-            <a:r>
-              <a:rPr lang="en-US" altLang="ko-KR" dirty="0"/>
-              <a:t>You can try to change interpolation methods or plot type</a:t>
-            </a:r>
-          </a:p>
-          <a:p>
-            <a:r>
-              <a:rPr lang="en-US" altLang="ko-KR" dirty="0"/>
-              <a:t>by changing ‘</a:t>
-            </a:r>
-            <a:r>
-              <a:rPr lang="en-US" altLang="ko-KR" dirty="0" err="1"/>
-              <a:t>istep</a:t>
-            </a:r>
-            <a:r>
-              <a:rPr lang="en-US" altLang="ko-KR" dirty="0"/>
-              <a:t>’, ‘</a:t>
-            </a:r>
-            <a:r>
-              <a:rPr lang="en-US" altLang="ko-KR" dirty="0" err="1"/>
-              <a:t>imethod</a:t>
-            </a:r>
-            <a:r>
-              <a:rPr lang="en-US" altLang="ko-KR" dirty="0"/>
-              <a:t>’ [‘</a:t>
-            </a:r>
-            <a:r>
-              <a:rPr lang="en-US" altLang="ko-KR" dirty="0" err="1"/>
-              <a:t>linear’,’nearest’,’cubic</a:t>
-            </a:r>
-            <a:r>
-              <a:rPr lang="en-US" altLang="ko-KR" dirty="0"/>
-              <a:t>’], ‘cutoff’, ‘</a:t>
-            </a:r>
-            <a:r>
-              <a:rPr lang="en-US" altLang="ko-KR" dirty="0" err="1"/>
-              <a:t>pmethod</a:t>
-            </a:r>
-            <a:r>
-              <a:rPr lang="en-US" altLang="ko-KR" dirty="0"/>
-              <a:t>’ [‘scatter’,’</a:t>
-            </a:r>
-            <a:r>
-              <a:rPr lang="en-US" altLang="ko-KR" dirty="0" err="1"/>
-              <a:t>contourf</a:t>
-            </a:r>
-            <a:r>
-              <a:rPr lang="en-US" altLang="ko-KR" dirty="0"/>
-              <a:t>’]</a:t>
-            </a:r>
-            <a:endParaRPr lang="ko-KR" altLang="en-US" dirty="0"/>
-          </a:p>
-        </p:txBody>
-      </p:sp>
-      <p:cxnSp>
-        <p:nvCxnSpPr>
-          <p:cNvPr id="9" name="직선 화살표 연결선 8">
-            <a:extLst>
-              <a:ext uri="{FF2B5EF4-FFF2-40B4-BE49-F238E27FC236}">
-                <a16:creationId xmlns:a16="http://schemas.microsoft.com/office/drawing/2014/main" id="{8394A4D1-1296-44F3-949F-0C194A59B115}"/>
-              </a:ext>
-            </a:extLst>
-          </p:cNvPr>
-          <p:cNvCxnSpPr>
-            <a:cxnSpLocks/>
-            <a:stCxn id="7" idx="0"/>
-          </p:cNvCxnSpPr>
-          <p:nvPr/>
-        </p:nvCxnSpPr>
-        <p:spPr>
-          <a:xfrm flipH="1" flipV="1">
-            <a:off x="6096000" y="3869367"/>
-            <a:ext cx="143838" cy="687179"/>
-          </a:xfrm>
-          <a:prstGeom prst="straightConnector1">
-            <a:avLst/>
-          </a:prstGeom>
-          <a:ln>
-            <a:tailEnd type="triangle"/>
-          </a:ln>
-        </p:spPr>
-        <p:style>
-          <a:lnRef idx="1">
-            <a:schemeClr val="accent1"/>
-          </a:lnRef>
-          <a:fillRef idx="0">
-            <a:schemeClr val="accent1"/>
-          </a:fillRef>
-          <a:effectRef idx="0">
-            <a:schemeClr val="accent1"/>
-          </a:effectRef>
-          <a:fontRef idx="minor">
-            <a:schemeClr val="tx1"/>
-          </a:fontRef>
-        </p:style>
-      </p:cxnSp>
-      <p:sp>
-        <p:nvSpPr>
-          <p:cNvPr id="11" name="TextBox 10">
-            <a:extLst>
-              <a:ext uri="{FF2B5EF4-FFF2-40B4-BE49-F238E27FC236}">
-                <a16:creationId xmlns:a16="http://schemas.microsoft.com/office/drawing/2014/main" id="{54C6FDB3-6449-4350-BFCA-ECB0740735B5}"/>
-              </a:ext>
-            </a:extLst>
-          </p:cNvPr>
-          <p:cNvSpPr txBox="1"/>
-          <p:nvPr/>
-        </p:nvSpPr>
-        <p:spPr>
-          <a:xfrm>
-            <a:off x="7320987" y="1516885"/>
-            <a:ext cx="4871013" cy="646331"/>
-          </a:xfrm>
-          <a:prstGeom prst="rect">
-            <a:avLst/>
-          </a:prstGeom>
-          <a:noFill/>
-        </p:spPr>
-        <p:txBody>
-          <a:bodyPr wrap="none" rtlCol="0">
-            <a:spAutoFit/>
-          </a:bodyPr>
-          <a:lstStyle/>
-          <a:p>
-            <a:r>
-              <a:rPr lang="en-US" altLang="ko-KR" dirty="0"/>
-              <a:t>You can also apply the </a:t>
-            </a:r>
-            <a:r>
-              <a:rPr lang="en-US" altLang="ko-KR" dirty="0" err="1"/>
-              <a:t>svd</a:t>
-            </a:r>
-            <a:r>
-              <a:rPr lang="en-US" altLang="ko-KR" dirty="0"/>
-              <a:t> filter after the FIR filter.</a:t>
-            </a:r>
-          </a:p>
-          <a:p>
-            <a:r>
-              <a:rPr lang="en-US" altLang="ko-KR" dirty="0"/>
-              <a:t>Please refer to ‘check_filter.py’ in ‘examples’</a:t>
-            </a:r>
-          </a:p>
-        </p:txBody>
-      </p:sp>
-      <p:cxnSp>
-        <p:nvCxnSpPr>
-          <p:cNvPr id="13" name="직선 화살표 연결선 12">
-            <a:extLst>
-              <a:ext uri="{FF2B5EF4-FFF2-40B4-BE49-F238E27FC236}">
-                <a16:creationId xmlns:a16="http://schemas.microsoft.com/office/drawing/2014/main" id="{98ED6744-4626-4652-907C-76707A17CCFD}"/>
-              </a:ext>
-            </a:extLst>
-          </p:cNvPr>
-          <p:cNvCxnSpPr>
-            <a:cxnSpLocks/>
-            <a:stCxn id="11" idx="1"/>
-          </p:cNvCxnSpPr>
-          <p:nvPr/>
-        </p:nvCxnSpPr>
-        <p:spPr>
-          <a:xfrm flipH="1">
-            <a:off x="5147355" y="1840051"/>
-            <a:ext cx="2173632" cy="1768669"/>
-          </a:xfrm>
-          <a:prstGeom prst="straightConnector1">
-            <a:avLst/>
-          </a:prstGeom>
-          <a:ln>
-            <a:tailEnd type="triangle"/>
-          </a:ln>
-        </p:spPr>
-        <p:style>
-          <a:lnRef idx="1">
-            <a:schemeClr val="accent1"/>
-          </a:lnRef>
-          <a:fillRef idx="0">
-            <a:schemeClr val="accent1"/>
-          </a:fillRef>
-          <a:effectRef idx="0">
-            <a:schemeClr val="accent1"/>
-          </a:effectRef>
-          <a:fontRef idx="minor">
-            <a:schemeClr val="tx1"/>
-          </a:fontRef>
-        </p:style>
-      </p:cxnSp>
-    </p:spTree>
-    <p:extLst>
-      <p:ext uri="{BB962C8B-B14F-4D97-AF65-F5344CB8AC3E}">
-        <p14:creationId xmlns:p14="http://schemas.microsoft.com/office/powerpoint/2010/main" val="2337217808"/>
       </p:ext>
     </p:extLst>
   </p:cSld>

</xml_diff>